<commit_message>
Asymmetries estimations, plot editions and statistics error fixed
</commit_message>
<xml_diff>
--- a/00_BasePPTX/PNAS_Tall_Image.pptx
+++ b/00_BasePPTX/PNAS_Tall_Image.pptx
@@ -2,12 +2,12 @@
 <file path=ppt/presentation.xml><?xml version="1.0" encoding="utf-8"?>
 <p:presentation xmlns:a="http://schemas.openxmlformats.org/drawingml/2006/main" xmlns:r="http://schemas.openxmlformats.org/officeDocument/2006/relationships" xmlns:p="http://schemas.openxmlformats.org/presentationml/2006/main" saveSubsetFonts="1">
   <p:sldMasterIdLst>
-    <p:sldMasterId id="2147483708" r:id="rId1"/>
+    <p:sldMasterId id="2147483720" r:id="rId1"/>
   </p:sldMasterIdLst>
   <p:sldIdLst>
     <p:sldId id="256" r:id="rId2"/>
   </p:sldIdLst>
-  <p:sldSz cx="6408738" cy="6408738"/>
+  <p:sldSz cx="6408738" cy="8999538"/>
   <p:notesSz cx="9144000" cy="6858000"/>
   <p:defaultTextStyle>
     <a:defPPr>
@@ -141,8 +141,8 @@
         </p:nvSpPr>
         <p:spPr>
           <a:xfrm>
-            <a:off x="480656" y="1048838"/>
-            <a:ext cx="5447427" cy="2231190"/>
+            <a:off x="480656" y="1472842"/>
+            <a:ext cx="5447427" cy="3133172"/>
           </a:xfrm>
         </p:spPr>
         <p:txBody>
@@ -173,8 +173,8 @@
         </p:nvSpPr>
         <p:spPr>
           <a:xfrm>
-            <a:off x="801092" y="3366072"/>
-            <a:ext cx="4806554" cy="1547294"/>
+            <a:off x="801092" y="4726842"/>
+            <a:ext cx="4806554" cy="2172804"/>
           </a:xfrm>
         </p:spPr>
         <p:txBody>
@@ -243,7 +243,7 @@
           <a:p>
             <a:fld id="{A1626F8F-BADC-42B5-8999-017B7F317904}" type="datetimeFigureOut">
               <a:rPr lang="en-US" smtClean="0"/>
-              <a:t>5/8/2023</a:t>
+              <a:t>5/24/2023</a:t>
             </a:fld>
             <a:endParaRPr lang="en-US"/>
           </a:p>
@@ -294,7 +294,7 @@
     </p:spTree>
     <p:extLst>
       <p:ext uri="{BB962C8B-B14F-4D97-AF65-F5344CB8AC3E}">
-        <p14:creationId xmlns:p14="http://schemas.microsoft.com/office/powerpoint/2010/main" val="1727726547"/>
+        <p14:creationId xmlns:p14="http://schemas.microsoft.com/office/powerpoint/2010/main" val="4089204208"/>
       </p:ext>
     </p:extLst>
   </p:cSld>
@@ -413,7 +413,7 @@
           <a:p>
             <a:fld id="{A1626F8F-BADC-42B5-8999-017B7F317904}" type="datetimeFigureOut">
               <a:rPr lang="en-US" smtClean="0"/>
-              <a:t>5/8/2023</a:t>
+              <a:t>5/24/2023</a:t>
             </a:fld>
             <a:endParaRPr lang="en-US"/>
           </a:p>
@@ -464,7 +464,7 @@
     </p:spTree>
     <p:extLst>
       <p:ext uri="{BB962C8B-B14F-4D97-AF65-F5344CB8AC3E}">
-        <p14:creationId xmlns:p14="http://schemas.microsoft.com/office/powerpoint/2010/main" val="1916407695"/>
+        <p14:creationId xmlns:p14="http://schemas.microsoft.com/office/powerpoint/2010/main" val="4285551289"/>
       </p:ext>
     </p:extLst>
   </p:cSld>
@@ -503,8 +503,8 @@
         </p:nvSpPr>
         <p:spPr>
           <a:xfrm>
-            <a:off x="4586254" y="341206"/>
-            <a:ext cx="1381884" cy="5431109"/>
+            <a:off x="4586254" y="479142"/>
+            <a:ext cx="1381884" cy="7626692"/>
           </a:xfrm>
         </p:spPr>
         <p:txBody>
@@ -531,8 +531,8 @@
         </p:nvSpPr>
         <p:spPr>
           <a:xfrm>
-            <a:off x="440601" y="341206"/>
-            <a:ext cx="4065543" cy="5431109"/>
+            <a:off x="440601" y="479142"/>
+            <a:ext cx="4065543" cy="7626692"/>
           </a:xfrm>
         </p:spPr>
         <p:txBody>
@@ -593,7 +593,7 @@
           <a:p>
             <a:fld id="{A1626F8F-BADC-42B5-8999-017B7F317904}" type="datetimeFigureOut">
               <a:rPr lang="en-US" smtClean="0"/>
-              <a:t>5/8/2023</a:t>
+              <a:t>5/24/2023</a:t>
             </a:fld>
             <a:endParaRPr lang="en-US"/>
           </a:p>
@@ -644,7 +644,7 @@
     </p:spTree>
     <p:extLst>
       <p:ext uri="{BB962C8B-B14F-4D97-AF65-F5344CB8AC3E}">
-        <p14:creationId xmlns:p14="http://schemas.microsoft.com/office/powerpoint/2010/main" val="1577380576"/>
+        <p14:creationId xmlns:p14="http://schemas.microsoft.com/office/powerpoint/2010/main" val="378016083"/>
       </p:ext>
     </p:extLst>
   </p:cSld>
@@ -763,7 +763,7 @@
           <a:p>
             <a:fld id="{A1626F8F-BADC-42B5-8999-017B7F317904}" type="datetimeFigureOut">
               <a:rPr lang="en-US" smtClean="0"/>
-              <a:t>5/8/2023</a:t>
+              <a:t>5/24/2023</a:t>
             </a:fld>
             <a:endParaRPr lang="en-US"/>
           </a:p>
@@ -814,7 +814,7 @@
     </p:spTree>
     <p:extLst>
       <p:ext uri="{BB962C8B-B14F-4D97-AF65-F5344CB8AC3E}">
-        <p14:creationId xmlns:p14="http://schemas.microsoft.com/office/powerpoint/2010/main" val="3464686585"/>
+        <p14:creationId xmlns:p14="http://schemas.microsoft.com/office/powerpoint/2010/main" val="2280455134"/>
       </p:ext>
     </p:extLst>
   </p:cSld>
@@ -853,8 +853,8 @@
         </p:nvSpPr>
         <p:spPr>
           <a:xfrm>
-            <a:off x="437263" y="1597736"/>
-            <a:ext cx="5527537" cy="2665857"/>
+            <a:off x="437263" y="2243638"/>
+            <a:ext cx="5527537" cy="3743557"/>
           </a:xfrm>
         </p:spPr>
         <p:txBody>
@@ -885,8 +885,8 @@
         </p:nvSpPr>
         <p:spPr>
           <a:xfrm>
-            <a:off x="437263" y="4288812"/>
-            <a:ext cx="5527537" cy="1401911"/>
+            <a:off x="437263" y="6022610"/>
+            <a:ext cx="5527537" cy="1968648"/>
           </a:xfrm>
         </p:spPr>
         <p:txBody>
@@ -1007,7 +1007,7 @@
           <a:p>
             <a:fld id="{A1626F8F-BADC-42B5-8999-017B7F317904}" type="datetimeFigureOut">
               <a:rPr lang="en-US" smtClean="0"/>
-              <a:t>5/8/2023</a:t>
+              <a:t>5/24/2023</a:t>
             </a:fld>
             <a:endParaRPr lang="en-US"/>
           </a:p>
@@ -1058,7 +1058,7 @@
     </p:spTree>
     <p:extLst>
       <p:ext uri="{BB962C8B-B14F-4D97-AF65-F5344CB8AC3E}">
-        <p14:creationId xmlns:p14="http://schemas.microsoft.com/office/powerpoint/2010/main" val="869849724"/>
+        <p14:creationId xmlns:p14="http://schemas.microsoft.com/office/powerpoint/2010/main" val="3210717802"/>
       </p:ext>
     </p:extLst>
   </p:cSld>
@@ -1120,8 +1120,8 @@
         </p:nvSpPr>
         <p:spPr>
           <a:xfrm>
-            <a:off x="440601" y="1706030"/>
-            <a:ext cx="2723714" cy="4066285"/>
+            <a:off x="440601" y="2395710"/>
+            <a:ext cx="2723714" cy="5710124"/>
           </a:xfrm>
         </p:spPr>
         <p:txBody>
@@ -1177,8 +1177,8 @@
         </p:nvSpPr>
         <p:spPr>
           <a:xfrm>
-            <a:off x="3244423" y="1706030"/>
-            <a:ext cx="2723714" cy="4066285"/>
+            <a:off x="3244423" y="2395710"/>
+            <a:ext cx="2723714" cy="5710124"/>
           </a:xfrm>
         </p:spPr>
         <p:txBody>
@@ -1239,7 +1239,7 @@
           <a:p>
             <a:fld id="{A1626F8F-BADC-42B5-8999-017B7F317904}" type="datetimeFigureOut">
               <a:rPr lang="en-US" smtClean="0"/>
-              <a:t>5/8/2023</a:t>
+              <a:t>5/24/2023</a:t>
             </a:fld>
             <a:endParaRPr lang="en-US"/>
           </a:p>
@@ -1290,7 +1290,7 @@
     </p:spTree>
     <p:extLst>
       <p:ext uri="{BB962C8B-B14F-4D97-AF65-F5344CB8AC3E}">
-        <p14:creationId xmlns:p14="http://schemas.microsoft.com/office/powerpoint/2010/main" val="2614587242"/>
+        <p14:creationId xmlns:p14="http://schemas.microsoft.com/office/powerpoint/2010/main" val="1581252807"/>
       </p:ext>
     </p:extLst>
   </p:cSld>
@@ -1329,8 +1329,8 @@
         </p:nvSpPr>
         <p:spPr>
           <a:xfrm>
-            <a:off x="441435" y="341208"/>
-            <a:ext cx="5527537" cy="1238726"/>
+            <a:off x="441435" y="479144"/>
+            <a:ext cx="5527537" cy="1739495"/>
           </a:xfrm>
         </p:spPr>
         <p:txBody>
@@ -1357,8 +1357,8 @@
         </p:nvSpPr>
         <p:spPr>
           <a:xfrm>
-            <a:off x="441436" y="1571031"/>
-            <a:ext cx="2711196" cy="769938"/>
+            <a:off x="441436" y="2206137"/>
+            <a:ext cx="2711196" cy="1081194"/>
           </a:xfrm>
         </p:spPr>
         <p:txBody>
@@ -1422,8 +1422,8 @@
         </p:nvSpPr>
         <p:spPr>
           <a:xfrm>
-            <a:off x="441436" y="2340969"/>
-            <a:ext cx="2711196" cy="3443214"/>
+            <a:off x="441436" y="3287331"/>
+            <a:ext cx="2711196" cy="4835169"/>
           </a:xfrm>
         </p:spPr>
         <p:txBody>
@@ -1479,8 +1479,8 @@
         </p:nvSpPr>
         <p:spPr>
           <a:xfrm>
-            <a:off x="3244424" y="1571031"/>
-            <a:ext cx="2724548" cy="769938"/>
+            <a:off x="3244424" y="2206137"/>
+            <a:ext cx="2724548" cy="1081194"/>
           </a:xfrm>
         </p:spPr>
         <p:txBody>
@@ -1544,8 +1544,8 @@
         </p:nvSpPr>
         <p:spPr>
           <a:xfrm>
-            <a:off x="3244424" y="2340969"/>
-            <a:ext cx="2724548" cy="3443214"/>
+            <a:off x="3244424" y="3287331"/>
+            <a:ext cx="2724548" cy="4835169"/>
           </a:xfrm>
         </p:spPr>
         <p:txBody>
@@ -1606,7 +1606,7 @@
           <a:p>
             <a:fld id="{A1626F8F-BADC-42B5-8999-017B7F317904}" type="datetimeFigureOut">
               <a:rPr lang="en-US" smtClean="0"/>
-              <a:t>5/8/2023</a:t>
+              <a:t>5/24/2023</a:t>
             </a:fld>
             <a:endParaRPr lang="en-US"/>
           </a:p>
@@ -1657,7 +1657,7 @@
     </p:spTree>
     <p:extLst>
       <p:ext uri="{BB962C8B-B14F-4D97-AF65-F5344CB8AC3E}">
-        <p14:creationId xmlns:p14="http://schemas.microsoft.com/office/powerpoint/2010/main" val="2340409953"/>
+        <p14:creationId xmlns:p14="http://schemas.microsoft.com/office/powerpoint/2010/main" val="864616951"/>
       </p:ext>
     </p:extLst>
   </p:cSld>
@@ -1724,7 +1724,7 @@
           <a:p>
             <a:fld id="{A1626F8F-BADC-42B5-8999-017B7F317904}" type="datetimeFigureOut">
               <a:rPr lang="en-US" smtClean="0"/>
-              <a:t>5/8/2023</a:t>
+              <a:t>5/24/2023</a:t>
             </a:fld>
             <a:endParaRPr lang="en-US"/>
           </a:p>
@@ -1775,7 +1775,7 @@
     </p:spTree>
     <p:extLst>
       <p:ext uri="{BB962C8B-B14F-4D97-AF65-F5344CB8AC3E}">
-        <p14:creationId xmlns:p14="http://schemas.microsoft.com/office/powerpoint/2010/main" val="620054191"/>
+        <p14:creationId xmlns:p14="http://schemas.microsoft.com/office/powerpoint/2010/main" val="471927585"/>
       </p:ext>
     </p:extLst>
   </p:cSld>
@@ -1819,7 +1819,7 @@
           <a:p>
             <a:fld id="{A1626F8F-BADC-42B5-8999-017B7F317904}" type="datetimeFigureOut">
               <a:rPr lang="en-US" smtClean="0"/>
-              <a:t>5/8/2023</a:t>
+              <a:t>5/24/2023</a:t>
             </a:fld>
             <a:endParaRPr lang="en-US"/>
           </a:p>
@@ -1870,7 +1870,7 @@
     </p:spTree>
     <p:extLst>
       <p:ext uri="{BB962C8B-B14F-4D97-AF65-F5344CB8AC3E}">
-        <p14:creationId xmlns:p14="http://schemas.microsoft.com/office/powerpoint/2010/main" val="2043990327"/>
+        <p14:creationId xmlns:p14="http://schemas.microsoft.com/office/powerpoint/2010/main" val="712919019"/>
       </p:ext>
     </p:extLst>
   </p:cSld>
@@ -1909,8 +1909,8 @@
         </p:nvSpPr>
         <p:spPr>
           <a:xfrm>
-            <a:off x="441435" y="427249"/>
-            <a:ext cx="2066985" cy="1495372"/>
+            <a:off x="441435" y="599969"/>
+            <a:ext cx="2066985" cy="2099892"/>
           </a:xfrm>
         </p:spPr>
         <p:txBody>
@@ -1941,8 +1941,8 @@
         </p:nvSpPr>
         <p:spPr>
           <a:xfrm>
-            <a:off x="2724548" y="922741"/>
-            <a:ext cx="3244424" cy="4554358"/>
+            <a:off x="2724548" y="1295769"/>
+            <a:ext cx="3244424" cy="6395505"/>
           </a:xfrm>
         </p:spPr>
         <p:txBody>
@@ -2026,8 +2026,8 @@
         </p:nvSpPr>
         <p:spPr>
           <a:xfrm>
-            <a:off x="441435" y="1922621"/>
-            <a:ext cx="2066985" cy="3561894"/>
+            <a:off x="441435" y="2699862"/>
+            <a:ext cx="2066985" cy="5001827"/>
           </a:xfrm>
         </p:spPr>
         <p:txBody>
@@ -2096,7 +2096,7 @@
           <a:p>
             <a:fld id="{A1626F8F-BADC-42B5-8999-017B7F317904}" type="datetimeFigureOut">
               <a:rPr lang="en-US" smtClean="0"/>
-              <a:t>5/8/2023</a:t>
+              <a:t>5/24/2023</a:t>
             </a:fld>
             <a:endParaRPr lang="en-US"/>
           </a:p>
@@ -2147,7 +2147,7 @@
     </p:spTree>
     <p:extLst>
       <p:ext uri="{BB962C8B-B14F-4D97-AF65-F5344CB8AC3E}">
-        <p14:creationId xmlns:p14="http://schemas.microsoft.com/office/powerpoint/2010/main" val="2506102615"/>
+        <p14:creationId xmlns:p14="http://schemas.microsoft.com/office/powerpoint/2010/main" val="976423292"/>
       </p:ext>
     </p:extLst>
   </p:cSld>
@@ -2186,8 +2186,8 @@
         </p:nvSpPr>
         <p:spPr>
           <a:xfrm>
-            <a:off x="441435" y="427249"/>
-            <a:ext cx="2066985" cy="1495372"/>
+            <a:off x="441435" y="599969"/>
+            <a:ext cx="2066985" cy="2099892"/>
           </a:xfrm>
         </p:spPr>
         <p:txBody>
@@ -2218,8 +2218,8 @@
         </p:nvSpPr>
         <p:spPr>
           <a:xfrm>
-            <a:off x="2724548" y="922741"/>
-            <a:ext cx="3244424" cy="4554358"/>
+            <a:off x="2724548" y="1295769"/>
+            <a:ext cx="3244424" cy="6395505"/>
           </a:xfrm>
         </p:spPr>
         <p:txBody>
@@ -2283,8 +2283,8 @@
         </p:nvSpPr>
         <p:spPr>
           <a:xfrm>
-            <a:off x="441435" y="1922621"/>
-            <a:ext cx="2066985" cy="3561894"/>
+            <a:off x="441435" y="2699862"/>
+            <a:ext cx="2066985" cy="5001827"/>
           </a:xfrm>
         </p:spPr>
         <p:txBody>
@@ -2353,7 +2353,7 @@
           <a:p>
             <a:fld id="{A1626F8F-BADC-42B5-8999-017B7F317904}" type="datetimeFigureOut">
               <a:rPr lang="en-US" smtClean="0"/>
-              <a:t>5/8/2023</a:t>
+              <a:t>5/24/2023</a:t>
             </a:fld>
             <a:endParaRPr lang="en-US"/>
           </a:p>
@@ -2404,7 +2404,7 @@
     </p:spTree>
     <p:extLst>
       <p:ext uri="{BB962C8B-B14F-4D97-AF65-F5344CB8AC3E}">
-        <p14:creationId xmlns:p14="http://schemas.microsoft.com/office/powerpoint/2010/main" val="1079218024"/>
+        <p14:creationId xmlns:p14="http://schemas.microsoft.com/office/powerpoint/2010/main" val="1504319676"/>
       </p:ext>
     </p:extLst>
   </p:cSld>
@@ -2448,8 +2448,8 @@
         </p:nvSpPr>
         <p:spPr>
           <a:xfrm>
-            <a:off x="440601" y="341208"/>
-            <a:ext cx="5527537" cy="1238726"/>
+            <a:off x="440601" y="479144"/>
+            <a:ext cx="5527537" cy="1739495"/>
           </a:xfrm>
           <a:prstGeom prst="rect">
             <a:avLst/>
@@ -2481,8 +2481,8 @@
         </p:nvSpPr>
         <p:spPr>
           <a:xfrm>
-            <a:off x="440601" y="1706030"/>
-            <a:ext cx="5527537" cy="4066285"/>
+            <a:off x="440601" y="2395710"/>
+            <a:ext cx="5527537" cy="5710124"/>
           </a:xfrm>
           <a:prstGeom prst="rect">
             <a:avLst/>
@@ -2543,8 +2543,8 @@
         </p:nvSpPr>
         <p:spPr>
           <a:xfrm>
-            <a:off x="440601" y="5939952"/>
-            <a:ext cx="1441966" cy="341206"/>
+            <a:off x="440601" y="8341240"/>
+            <a:ext cx="1441966" cy="479142"/>
           </a:xfrm>
           <a:prstGeom prst="rect">
             <a:avLst/>
@@ -2566,7 +2566,7 @@
           <a:p>
             <a:fld id="{A1626F8F-BADC-42B5-8999-017B7F317904}" type="datetimeFigureOut">
               <a:rPr lang="en-US" smtClean="0"/>
-              <a:t>5/8/2023</a:t>
+              <a:t>5/24/2023</a:t>
             </a:fld>
             <a:endParaRPr lang="en-US"/>
           </a:p>
@@ -2584,8 +2584,8 @@
         </p:nvSpPr>
         <p:spPr>
           <a:xfrm>
-            <a:off x="2122895" y="5939952"/>
-            <a:ext cx="2162949" cy="341206"/>
+            <a:off x="2122895" y="8341240"/>
+            <a:ext cx="2162949" cy="479142"/>
           </a:xfrm>
           <a:prstGeom prst="rect">
             <a:avLst/>
@@ -2621,8 +2621,8 @@
         </p:nvSpPr>
         <p:spPr>
           <a:xfrm>
-            <a:off x="4526171" y="5939952"/>
-            <a:ext cx="1441966" cy="341206"/>
+            <a:off x="4526171" y="8341240"/>
+            <a:ext cx="1441966" cy="479142"/>
           </a:xfrm>
           <a:prstGeom prst="rect">
             <a:avLst/>
@@ -2653,23 +2653,23 @@
     </p:spTree>
     <p:extLst>
       <p:ext uri="{BB962C8B-B14F-4D97-AF65-F5344CB8AC3E}">
-        <p14:creationId xmlns:p14="http://schemas.microsoft.com/office/powerpoint/2010/main" val="1379266162"/>
+        <p14:creationId xmlns:p14="http://schemas.microsoft.com/office/powerpoint/2010/main" val="2350061715"/>
       </p:ext>
     </p:extLst>
   </p:cSld>
   <p:clrMap bg1="lt1" tx1="dk1" bg2="lt2" tx2="dk2" accent1="accent1" accent2="accent2" accent3="accent3" accent4="accent4" accent5="accent5" accent6="accent6" hlink="hlink" folHlink="folHlink"/>
   <p:sldLayoutIdLst>
-    <p:sldLayoutId id="2147483709" r:id="rId1"/>
-    <p:sldLayoutId id="2147483710" r:id="rId2"/>
-    <p:sldLayoutId id="2147483711" r:id="rId3"/>
-    <p:sldLayoutId id="2147483712" r:id="rId4"/>
-    <p:sldLayoutId id="2147483713" r:id="rId5"/>
-    <p:sldLayoutId id="2147483714" r:id="rId6"/>
-    <p:sldLayoutId id="2147483715" r:id="rId7"/>
-    <p:sldLayoutId id="2147483716" r:id="rId8"/>
-    <p:sldLayoutId id="2147483717" r:id="rId9"/>
-    <p:sldLayoutId id="2147483718" r:id="rId10"/>
-    <p:sldLayoutId id="2147483719" r:id="rId11"/>
+    <p:sldLayoutId id="2147483721" r:id="rId1"/>
+    <p:sldLayoutId id="2147483722" r:id="rId2"/>
+    <p:sldLayoutId id="2147483723" r:id="rId3"/>
+    <p:sldLayoutId id="2147483724" r:id="rId4"/>
+    <p:sldLayoutId id="2147483725" r:id="rId5"/>
+    <p:sldLayoutId id="2147483726" r:id="rId6"/>
+    <p:sldLayoutId id="2147483727" r:id="rId7"/>
+    <p:sldLayoutId id="2147483728" r:id="rId8"/>
+    <p:sldLayoutId id="2147483729" r:id="rId9"/>
+    <p:sldLayoutId id="2147483730" r:id="rId10"/>
+    <p:sldLayoutId id="2147483731" r:id="rId11"/>
   </p:sldLayoutIdLst>
   <p:txStyles>
     <p:titleStyle>

</xml_diff>